<commit_message>
Added pics to slides
</commit_message>
<xml_diff>
--- a/Biomedical Engineering.pptx
+++ b/Biomedical Engineering.pptx
@@ -3914,7 +3914,12 @@
             <p:ph idx="1"/>
           </p:nvPr>
         </p:nvSpPr>
-        <p:spPr/>
+        <p:spPr>
+          <a:xfrm>
+            <a:off x="457200" y="1775191"/>
+            <a:ext cx="4419600" cy="4625609"/>
+          </a:xfrm>
+        </p:spPr>
         <p:txBody>
           <a:bodyPr/>
           <a:lstStyle/>
@@ -3929,7 +3934,6 @@
               <a:rPr lang="en-US" dirty="0" smtClean="0"/>
               <a:t>Efficiency</a:t>
             </a:r>
-            <a:endParaRPr lang="en-US" dirty="0" smtClean="0"/>
           </a:p>
           <a:p>
             <a:r>
@@ -3951,6 +3955,72 @@
           </a:p>
         </p:txBody>
       </p:sp>
+      <p:pic>
+        <p:nvPicPr>
+          <p:cNvPr id="3074" name="Picture 2"/>
+          <p:cNvPicPr>
+            <a:picLocks noChangeAspect="1" noChangeArrowheads="1"/>
+          </p:cNvPicPr>
+          <p:nvPr/>
+        </p:nvPicPr>
+        <p:blipFill>
+          <a:blip r:embed="rId2">
+            <a:extLst>
+              <a:ext uri="{BEBA8EAE-BF5A-486C-A8C5-ECC9F3942E4B}">
+                <a14:imgProps xmlns:a14="http://schemas.microsoft.com/office/drawing/2010/main">
+                  <a14:imgLayer r:embed="rId3">
+                    <a14:imgEffect>
+                      <a14:colorTemperature colorTemp="6900"/>
+                    </a14:imgEffect>
+                    <a14:imgEffect>
+                      <a14:saturation sat="0"/>
+                    </a14:imgEffect>
+                  </a14:imgLayer>
+                </a14:imgProps>
+              </a:ext>
+              <a:ext uri="{28A0092B-C50C-407E-A947-70E740481C1C}">
+                <a14:useLocalDpi xmlns:a14="http://schemas.microsoft.com/office/drawing/2010/main" val="0"/>
+              </a:ext>
+            </a:extLst>
+          </a:blip>
+          <a:srcRect/>
+          <a:stretch>
+            <a:fillRect/>
+          </a:stretch>
+        </p:blipFill>
+        <p:spPr bwMode="auto">
+          <a:xfrm>
+            <a:off x="4343400" y="1808148"/>
+            <a:ext cx="3869384" cy="3962400"/>
+          </a:xfrm>
+          <a:prstGeom prst="rect">
+            <a:avLst/>
+          </a:prstGeom>
+          <a:noFill/>
+          <a:ln>
+            <a:noFill/>
+          </a:ln>
+          <a:extLst>
+            <a:ext uri="{909E8E84-426E-40DD-AFC4-6F175D3DCCD1}">
+              <a14:hiddenFill xmlns:a14="http://schemas.microsoft.com/office/drawing/2010/main">
+                <a:solidFill>
+                  <a:schemeClr val="accent1"/>
+                </a:solidFill>
+              </a14:hiddenFill>
+            </a:ext>
+            <a:ext uri="{91240B29-F687-4F45-9708-019B960494DF}">
+              <a14:hiddenLine xmlns:a14="http://schemas.microsoft.com/office/drawing/2010/main" w="9525">
+                <a:solidFill>
+                  <a:schemeClr val="tx1"/>
+                </a:solidFill>
+                <a:miter lim="800000"/>
+                <a:headEnd/>
+                <a:tailEnd/>
+              </a14:hiddenLine>
+            </a:ext>
+          </a:extLst>
+        </p:spPr>
+      </p:pic>
     </p:spTree>
     <p:extLst>
       <p:ext uri="{BB962C8B-B14F-4D97-AF65-F5344CB8AC3E}">
@@ -4016,10 +4086,15 @@
             <p:ph idx="1"/>
           </p:nvPr>
         </p:nvSpPr>
-        <p:spPr/>
+        <p:spPr>
+          <a:xfrm>
+            <a:off x="457200" y="1775191"/>
+            <a:ext cx="4953000" cy="1882409"/>
+          </a:xfrm>
+        </p:spPr>
         <p:txBody>
           <a:bodyPr>
-            <a:normAutofit fontScale="70000" lnSpcReduction="20000"/>
+            <a:normAutofit fontScale="62500" lnSpcReduction="20000"/>
           </a:bodyPr>
           <a:lstStyle/>
           <a:p>
@@ -4047,45 +4122,118 @@
             </a:r>
           </a:p>
           <a:p>
-            <a:r>
-              <a:rPr lang="en-US" dirty="0" smtClean="0"/>
+            <a:endParaRPr lang="en-US" dirty="0"/>
+          </a:p>
+        </p:txBody>
+      </p:sp>
+      <p:pic>
+        <p:nvPicPr>
+          <p:cNvPr id="1026" name="Picture 2"/>
+          <p:cNvPicPr>
+            <a:picLocks noChangeAspect="1" noChangeArrowheads="1"/>
+          </p:cNvPicPr>
+          <p:nvPr/>
+        </p:nvPicPr>
+        <p:blipFill>
+          <a:blip r:embed="rId2">
+            <a:extLst>
+              <a:ext uri="{28A0092B-C50C-407E-A947-70E740481C1C}">
+                <a14:useLocalDpi xmlns:a14="http://schemas.microsoft.com/office/drawing/2010/main" val="0"/>
+              </a:ext>
+            </a:extLst>
+          </a:blip>
+          <a:srcRect/>
+          <a:stretch>
+            <a:fillRect/>
+          </a:stretch>
+        </p:blipFill>
+        <p:spPr bwMode="auto">
+          <a:xfrm>
+            <a:off x="5791200" y="1905000"/>
+            <a:ext cx="2895600" cy="1600200"/>
+          </a:xfrm>
+          <a:prstGeom prst="rect">
+            <a:avLst/>
+          </a:prstGeom>
+          <a:noFill/>
+          <a:ln>
+            <a:noFill/>
+          </a:ln>
+          <a:extLst>
+            <a:ext uri="{909E8E84-426E-40DD-AFC4-6F175D3DCCD1}">
+              <a14:hiddenFill xmlns:a14="http://schemas.microsoft.com/office/drawing/2010/main">
+                <a:solidFill>
+                  <a:schemeClr val="accent1"/>
+                </a:solidFill>
+              </a14:hiddenFill>
+            </a:ext>
+            <a:ext uri="{91240B29-F687-4F45-9708-019B960494DF}">
+              <a14:hiddenLine xmlns:a14="http://schemas.microsoft.com/office/drawing/2010/main" w="9525">
+                <a:solidFill>
+                  <a:schemeClr val="tx1"/>
+                </a:solidFill>
+                <a:miter lim="800000"/>
+                <a:headEnd/>
+                <a:tailEnd/>
+              </a14:hiddenLine>
+            </a:ext>
+          </a:extLst>
+        </p:spPr>
+      </p:pic>
+      <p:sp>
+        <p:nvSpPr>
+          <p:cNvPr id="4" name="TextBox 3"/>
+          <p:cNvSpPr txBox="1"/>
+          <p:nvPr/>
+        </p:nvSpPr>
+        <p:spPr>
+          <a:xfrm>
+            <a:off x="685800" y="3886200"/>
+            <a:ext cx="7848600" cy="2308324"/>
+          </a:xfrm>
+          <a:prstGeom prst="rect">
+            <a:avLst/>
+          </a:prstGeom>
+          <a:noFill/>
+        </p:spPr>
+        <p:txBody>
+          <a:bodyPr wrap="square" rtlCol="0">
+            <a:spAutoFit/>
+          </a:bodyPr>
+          <a:lstStyle/>
+          <a:p>
+            <a:r>
+              <a:rPr lang="en-US" dirty="0"/>
               <a:t>Accurately track all record creations, modifications, and deletions</a:t>
             </a:r>
           </a:p>
           <a:p>
             <a:r>
-              <a:rPr lang="en-US" dirty="0" smtClean="0"/>
+              <a:rPr lang="en-US" dirty="0"/>
               <a:t>System checks to ensure correct sequencing of steps and events</a:t>
             </a:r>
           </a:p>
           <a:p>
             <a:r>
-              <a:rPr lang="en-US" dirty="0" smtClean="0"/>
+              <a:rPr lang="en-US" dirty="0"/>
               <a:t>More at </a:t>
             </a:r>
             <a:r>
               <a:rPr lang="en-US" u="sng" dirty="0">
-                <a:hlinkClick r:id="rId2"/>
+                <a:hlinkClick r:id="rId3"/>
               </a:rPr>
-              <a:t>http://</a:t>
-            </a:r>
-            <a:r>
-              <a:rPr lang="en-US" u="sng" dirty="0" smtClean="0">
-                <a:hlinkClick r:id="rId2"/>
-              </a:rPr>
-              <a:t>www.accessdata.fda.gov/scripts/cdrh/cfdocs/cfcfr/CFRSearch.cfm?CFRPart=11&amp;showFR=1&amp;subpartNode=21:1.0.1.1.7.2</a:t>
-            </a:r>
-            <a:endParaRPr lang="en-US" u="sng" dirty="0" smtClean="0"/>
-          </a:p>
-          <a:p>
+              <a:t>http://www.accessdata.fda.gov/scripts/cdrh/cfdocs/cfcfr/CFRSearch.cfm?CFRPart=11&amp;showFR=1&amp;subpartNode=21:1.0.1.1.7.2</a:t>
+            </a:r>
             <a:endParaRPr lang="en-US" u="sng" dirty="0"/>
           </a:p>
           <a:p>
-            <a:r>
-              <a:rPr lang="en-US" dirty="0" smtClean="0"/>
+            <a:endParaRPr lang="en-US" u="sng" dirty="0"/>
+          </a:p>
+          <a:p>
+            <a:r>
+              <a:rPr lang="en-US" dirty="0"/>
               <a:t>All other testing is up to the developer</a:t>
             </a:r>
-            <a:endParaRPr lang="en-US" dirty="0"/>
           </a:p>
           <a:p>
             <a:endParaRPr lang="en-US" dirty="0"/>
@@ -4157,10 +4305,15 @@
             <p:ph idx="1"/>
           </p:nvPr>
         </p:nvSpPr>
-        <p:spPr/>
+        <p:spPr>
+          <a:xfrm>
+            <a:off x="457200" y="1775191"/>
+            <a:ext cx="4038600" cy="4625609"/>
+          </a:xfrm>
+        </p:spPr>
         <p:txBody>
           <a:bodyPr>
-            <a:normAutofit/>
+            <a:normAutofit fontScale="85000" lnSpcReduction="20000"/>
           </a:bodyPr>
           <a:lstStyle/>
           <a:p>
@@ -4233,6 +4386,101 @@
           </a:p>
         </p:txBody>
       </p:sp>
+      <p:pic>
+        <p:nvPicPr>
+          <p:cNvPr id="4098" name="Picture 2"/>
+          <p:cNvPicPr>
+            <a:picLocks noChangeAspect="1" noChangeArrowheads="1"/>
+          </p:cNvPicPr>
+          <p:nvPr/>
+        </p:nvPicPr>
+        <p:blipFill>
+          <a:blip r:embed="rId2">
+            <a:extLst>
+              <a:ext uri="{28A0092B-C50C-407E-A947-70E740481C1C}">
+                <a14:useLocalDpi xmlns:a14="http://schemas.microsoft.com/office/drawing/2010/main" val="0"/>
+              </a:ext>
+            </a:extLst>
+          </a:blip>
+          <a:srcRect/>
+          <a:stretch>
+            <a:fillRect/>
+          </a:stretch>
+        </p:blipFill>
+        <p:spPr bwMode="auto">
+          <a:xfrm>
+            <a:off x="4876800" y="1828800"/>
+            <a:ext cx="2381250" cy="2486025"/>
+          </a:xfrm>
+          <a:prstGeom prst="rect">
+            <a:avLst/>
+          </a:prstGeom>
+          <a:noFill/>
+          <a:ln>
+            <a:noFill/>
+          </a:ln>
+          <a:extLst>
+            <a:ext uri="{909E8E84-426E-40DD-AFC4-6F175D3DCCD1}">
+              <a14:hiddenFill xmlns:a14="http://schemas.microsoft.com/office/drawing/2010/main">
+                <a:solidFill>
+                  <a:schemeClr val="accent1"/>
+                </a:solidFill>
+              </a14:hiddenFill>
+            </a:ext>
+            <a:ext uri="{91240B29-F687-4F45-9708-019B960494DF}">
+              <a14:hiddenLine xmlns:a14="http://schemas.microsoft.com/office/drawing/2010/main" w="9525">
+                <a:solidFill>
+                  <a:schemeClr val="tx1"/>
+                </a:solidFill>
+                <a:miter lim="800000"/>
+                <a:headEnd/>
+                <a:tailEnd/>
+              </a14:hiddenLine>
+            </a:ext>
+          </a:extLst>
+        </p:spPr>
+      </p:pic>
+      <p:pic>
+        <p:nvPicPr>
+          <p:cNvPr id="4100" name="Picture 4" descr="http://www.rexheartvascular.com/images/holter.jpg"/>
+          <p:cNvPicPr>
+            <a:picLocks noChangeAspect="1" noChangeArrowheads="1"/>
+          </p:cNvPicPr>
+          <p:nvPr/>
+        </p:nvPicPr>
+        <p:blipFill>
+          <a:blip r:embed="rId3">
+            <a:extLst>
+              <a:ext uri="{28A0092B-C50C-407E-A947-70E740481C1C}">
+                <a14:useLocalDpi xmlns:a14="http://schemas.microsoft.com/office/drawing/2010/main" val="0"/>
+              </a:ext>
+            </a:extLst>
+          </a:blip>
+          <a:srcRect/>
+          <a:stretch>
+            <a:fillRect/>
+          </a:stretch>
+        </p:blipFill>
+        <p:spPr bwMode="auto">
+          <a:xfrm>
+            <a:off x="5861969" y="4038600"/>
+            <a:ext cx="3047999" cy="2438400"/>
+          </a:xfrm>
+          <a:prstGeom prst="rect">
+            <a:avLst/>
+          </a:prstGeom>
+          <a:noFill/>
+          <a:extLst>
+            <a:ext uri="{909E8E84-426E-40DD-AFC4-6F175D3DCCD1}">
+              <a14:hiddenFill xmlns:a14="http://schemas.microsoft.com/office/drawing/2010/main">
+                <a:solidFill>
+                  <a:srgbClr val="FFFFFF"/>
+                </a:solidFill>
+              </a14:hiddenFill>
+            </a:ext>
+          </a:extLst>
+        </p:spPr>
+      </p:pic>
     </p:spTree>
     <p:extLst>
       <p:ext uri="{BB962C8B-B14F-4D97-AF65-F5344CB8AC3E}">
@@ -4436,9 +4684,16 @@
             <p:ph idx="1"/>
           </p:nvPr>
         </p:nvSpPr>
-        <p:spPr/>
-        <p:txBody>
-          <a:bodyPr/>
+        <p:spPr>
+          <a:xfrm>
+            <a:off x="457200" y="1775191"/>
+            <a:ext cx="3200400" cy="4625609"/>
+          </a:xfrm>
+        </p:spPr>
+        <p:txBody>
+          <a:bodyPr>
+            <a:normAutofit fontScale="85000" lnSpcReduction="10000"/>
+          </a:bodyPr>
           <a:lstStyle/>
           <a:p>
             <a:r>
@@ -4461,6 +4716,60 @@
           </a:p>
         </p:txBody>
       </p:sp>
+      <p:pic>
+        <p:nvPicPr>
+          <p:cNvPr id="5122" name="Picture 2"/>
+          <p:cNvPicPr>
+            <a:picLocks noChangeAspect="1" noChangeArrowheads="1"/>
+          </p:cNvPicPr>
+          <p:nvPr/>
+        </p:nvPicPr>
+        <p:blipFill>
+          <a:blip r:embed="rId2">
+            <a:extLst>
+              <a:ext uri="{28A0092B-C50C-407E-A947-70E740481C1C}">
+                <a14:useLocalDpi xmlns:a14="http://schemas.microsoft.com/office/drawing/2010/main" val="0"/>
+              </a:ext>
+            </a:extLst>
+          </a:blip>
+          <a:srcRect/>
+          <a:stretch>
+            <a:fillRect/>
+          </a:stretch>
+        </p:blipFill>
+        <p:spPr bwMode="auto">
+          <a:xfrm>
+            <a:off x="4038600" y="1981200"/>
+            <a:ext cx="4495800" cy="3733800"/>
+          </a:xfrm>
+          <a:prstGeom prst="rect">
+            <a:avLst/>
+          </a:prstGeom>
+          <a:noFill/>
+          <a:ln>
+            <a:noFill/>
+          </a:ln>
+          <a:extLst>
+            <a:ext uri="{909E8E84-426E-40DD-AFC4-6F175D3DCCD1}">
+              <a14:hiddenFill xmlns:a14="http://schemas.microsoft.com/office/drawing/2010/main">
+                <a:solidFill>
+                  <a:schemeClr val="accent1"/>
+                </a:solidFill>
+              </a14:hiddenFill>
+            </a:ext>
+            <a:ext uri="{91240B29-F687-4F45-9708-019B960494DF}">
+              <a14:hiddenLine xmlns:a14="http://schemas.microsoft.com/office/drawing/2010/main" w="9525">
+                <a:solidFill>
+                  <a:schemeClr val="tx1"/>
+                </a:solidFill>
+                <a:miter lim="800000"/>
+                <a:headEnd/>
+                <a:tailEnd/>
+              </a14:hiddenLine>
+            </a:ext>
+          </a:extLst>
+        </p:spPr>
+      </p:pic>
     </p:spTree>
     <p:extLst>
       <p:ext uri="{BB962C8B-B14F-4D97-AF65-F5344CB8AC3E}">
@@ -4491,6 +4800,60 @@
           <a:chExt cx="0" cy="0"/>
         </a:xfrm>
       </p:grpSpPr>
+      <p:pic>
+        <p:nvPicPr>
+          <p:cNvPr id="6147" name="Picture 3"/>
+          <p:cNvPicPr>
+            <a:picLocks noChangeAspect="1" noChangeArrowheads="1"/>
+          </p:cNvPicPr>
+          <p:nvPr/>
+        </p:nvPicPr>
+        <p:blipFill>
+          <a:blip r:embed="rId2">
+            <a:extLst>
+              <a:ext uri="{28A0092B-C50C-407E-A947-70E740481C1C}">
+                <a14:useLocalDpi xmlns:a14="http://schemas.microsoft.com/office/drawing/2010/main" val="0"/>
+              </a:ext>
+            </a:extLst>
+          </a:blip>
+          <a:srcRect/>
+          <a:stretch>
+            <a:fillRect/>
+          </a:stretch>
+        </p:blipFill>
+        <p:spPr bwMode="auto">
+          <a:xfrm>
+            <a:off x="609600" y="3562350"/>
+            <a:ext cx="2143125" cy="3295650"/>
+          </a:xfrm>
+          <a:prstGeom prst="rect">
+            <a:avLst/>
+          </a:prstGeom>
+          <a:noFill/>
+          <a:ln>
+            <a:noFill/>
+          </a:ln>
+          <a:extLst>
+            <a:ext uri="{909E8E84-426E-40DD-AFC4-6F175D3DCCD1}">
+              <a14:hiddenFill xmlns:a14="http://schemas.microsoft.com/office/drawing/2010/main">
+                <a:solidFill>
+                  <a:schemeClr val="accent1"/>
+                </a:solidFill>
+              </a14:hiddenFill>
+            </a:ext>
+            <a:ext uri="{91240B29-F687-4F45-9708-019B960494DF}">
+              <a14:hiddenLine xmlns:a14="http://schemas.microsoft.com/office/drawing/2010/main" w="9525">
+                <a:solidFill>
+                  <a:schemeClr val="tx1"/>
+                </a:solidFill>
+                <a:miter lim="800000"/>
+                <a:headEnd/>
+                <a:tailEnd/>
+              </a14:hiddenLine>
+            </a:ext>
+          </a:extLst>
+        </p:spPr>
+      </p:pic>
       <p:sp>
         <p:nvSpPr>
           <p:cNvPr id="2" name="Title 1"/>
@@ -4524,7 +4887,12 @@
             <p:ph idx="1"/>
           </p:nvPr>
         </p:nvSpPr>
-        <p:spPr/>
+        <p:spPr>
+          <a:xfrm>
+            <a:off x="1219200" y="1706745"/>
+            <a:ext cx="5862503" cy="2187209"/>
+          </a:xfrm>
+        </p:spPr>
         <p:txBody>
           <a:bodyPr/>
           <a:lstStyle/>
@@ -4549,23 +4917,126 @@
             </a:r>
           </a:p>
           <a:p>
-            <a:r>
-              <a:rPr lang="en-US" dirty="0" smtClean="0"/>
-              <a:t>Software for equipment and devices</a:t>
-            </a:r>
-          </a:p>
-          <a:p>
-            <a:pPr lvl="1"/>
-            <a:r>
-              <a:rPr lang="en-US" dirty="0" smtClean="0"/>
-              <a:t>Robust Worst Case Testing</a:t>
-            </a:r>
-          </a:p>
-          <a:p>
             <a:pPr marL="457200" lvl="1" indent="0">
               <a:buNone/>
             </a:pPr>
             <a:endParaRPr lang="en-US" dirty="0"/>
+          </a:p>
+        </p:txBody>
+      </p:sp>
+      <p:pic>
+        <p:nvPicPr>
+          <p:cNvPr id="6146" name="Picture 2"/>
+          <p:cNvPicPr>
+            <a:picLocks noChangeAspect="1" noChangeArrowheads="1"/>
+          </p:cNvPicPr>
+          <p:nvPr/>
+        </p:nvPicPr>
+        <p:blipFill>
+          <a:blip r:embed="rId3">
+            <a:extLst>
+              <a:ext uri="{28A0092B-C50C-407E-A947-70E740481C1C}">
+                <a14:useLocalDpi xmlns:a14="http://schemas.microsoft.com/office/drawing/2010/main" val="0"/>
+              </a:ext>
+            </a:extLst>
+          </a:blip>
+          <a:srcRect/>
+          <a:stretch>
+            <a:fillRect/>
+          </a:stretch>
+        </p:blipFill>
+        <p:spPr bwMode="auto">
+          <a:xfrm>
+            <a:off x="5715000" y="2057400"/>
+            <a:ext cx="3052628" cy="1791986"/>
+          </a:xfrm>
+          <a:prstGeom prst="rect">
+            <a:avLst/>
+          </a:prstGeom>
+          <a:noFill/>
+          <a:ln>
+            <a:noFill/>
+          </a:ln>
+          <a:extLst>
+            <a:ext uri="{909E8E84-426E-40DD-AFC4-6F175D3DCCD1}">
+              <a14:hiddenFill xmlns:a14="http://schemas.microsoft.com/office/drawing/2010/main">
+                <a:solidFill>
+                  <a:schemeClr val="accent1"/>
+                </a:solidFill>
+              </a14:hiddenFill>
+            </a:ext>
+            <a:ext uri="{91240B29-F687-4F45-9708-019B960494DF}">
+              <a14:hiddenLine xmlns:a14="http://schemas.microsoft.com/office/drawing/2010/main" w="9525">
+                <a:solidFill>
+                  <a:schemeClr val="tx1"/>
+                </a:solidFill>
+                <a:miter lim="800000"/>
+                <a:headEnd/>
+                <a:tailEnd/>
+              </a14:hiddenLine>
+            </a:ext>
+          </a:extLst>
+        </p:spPr>
+      </p:pic>
+      <p:sp>
+        <p:nvSpPr>
+          <p:cNvPr id="5" name="TextBox 4"/>
+          <p:cNvSpPr txBox="1"/>
+          <p:nvPr/>
+        </p:nvSpPr>
+        <p:spPr>
+          <a:xfrm>
+            <a:off x="3124200" y="4413033"/>
+            <a:ext cx="5867400" cy="1594283"/>
+          </a:xfrm>
+          <a:prstGeom prst="rect">
+            <a:avLst/>
+          </a:prstGeom>
+          <a:noFill/>
+        </p:spPr>
+        <p:txBody>
+          <a:bodyPr wrap="square" rtlCol="0">
+            <a:spAutoFit/>
+          </a:bodyPr>
+          <a:lstStyle/>
+          <a:p>
+            <a:pPr marL="438912" lvl="0" indent="-320040">
+              <a:buClr>
+                <a:srgbClr val="F0AD00"/>
+              </a:buClr>
+              <a:buSzPct val="80000"/>
+              <a:buFont typeface="Wingdings 2"/>
+              <a:buChar char=""/>
+            </a:pPr>
+            <a:r>
+              <a:rPr lang="en-US" sz="3200" dirty="0">
+                <a:solidFill>
+                  <a:prstClr val="black"/>
+                </a:solidFill>
+              </a:rPr>
+              <a:t>Software for equipment and devices</a:t>
+            </a:r>
+          </a:p>
+          <a:p>
+            <a:pPr marL="731520" lvl="1" indent="-274320">
+              <a:spcBef>
+                <a:spcPct val="20000"/>
+              </a:spcBef>
+              <a:buClr>
+                <a:srgbClr val="60B5CC"/>
+              </a:buClr>
+              <a:buSzPct val="90000"/>
+              <a:buFont typeface="Wingdings"/>
+              <a:buChar char=""/>
+            </a:pPr>
+            <a:r>
+              <a:rPr lang="en-US" sz="2800" dirty="0">
+                <a:solidFill>
+                  <a:prstClr val="black"/>
+                </a:solidFill>
+              </a:rPr>
+              <a:t>Robust Worst Case Testing</a:t>
+            </a:r>
           </a:p>
         </p:txBody>
       </p:sp>
@@ -4616,15 +5087,7 @@
           <a:p>
             <a:r>
               <a:rPr lang="en-US" smtClean="0"/>
-              <a:t>Successes </a:t>
-            </a:r>
-            <a:r>
-              <a:rPr lang="en-US" smtClean="0"/>
-              <a:t>and </a:t>
-            </a:r>
-            <a:r>
-              <a:rPr lang="en-US" smtClean="0"/>
-              <a:t>Failures</a:t>
+              <a:t>Successes and Failures</a:t>
             </a:r>
             <a:endParaRPr lang="en-US" dirty="0"/>
           </a:p>
@@ -4640,10 +5103,15 @@
             <p:ph idx="1"/>
           </p:nvPr>
         </p:nvSpPr>
-        <p:spPr/>
+        <p:spPr>
+          <a:xfrm>
+            <a:off x="228600" y="1647825"/>
+            <a:ext cx="4191000" cy="3067050"/>
+          </a:xfrm>
+        </p:spPr>
         <p:txBody>
           <a:bodyPr>
-            <a:normAutofit fontScale="92500" lnSpcReduction="10000"/>
+            <a:normAutofit fontScale="70000" lnSpcReduction="20000"/>
           </a:bodyPr>
           <a:lstStyle/>
           <a:p>
@@ -4673,23 +5141,140 @@
               <a:t>Heart rate monitor fails and gives incorrect results such as flat-lining </a:t>
             </a:r>
           </a:p>
-          <a:p>
-            <a:r>
-              <a:rPr lang="en-US" dirty="0" smtClean="0"/>
+        </p:txBody>
+      </p:sp>
+      <p:pic>
+        <p:nvPicPr>
+          <p:cNvPr id="2050" name="Picture 2"/>
+          <p:cNvPicPr>
+            <a:picLocks noChangeAspect="1" noChangeArrowheads="1"/>
+          </p:cNvPicPr>
+          <p:nvPr/>
+        </p:nvPicPr>
+        <p:blipFill>
+          <a:blip r:embed="rId2">
+            <a:extLst>
+              <a:ext uri="{28A0092B-C50C-407E-A947-70E740481C1C}">
+                <a14:useLocalDpi xmlns:a14="http://schemas.microsoft.com/office/drawing/2010/main" val="0"/>
+              </a:ext>
+            </a:extLst>
+          </a:blip>
+          <a:srcRect/>
+          <a:stretch>
+            <a:fillRect/>
+          </a:stretch>
+        </p:blipFill>
+        <p:spPr bwMode="auto">
+          <a:xfrm>
+            <a:off x="4819650" y="1828800"/>
+            <a:ext cx="3981450" cy="2705100"/>
+          </a:xfrm>
+          <a:prstGeom prst="rect">
+            <a:avLst/>
+          </a:prstGeom>
+          <a:noFill/>
+          <a:ln>
+            <a:noFill/>
+          </a:ln>
+          <a:extLst>
+            <a:ext uri="{909E8E84-426E-40DD-AFC4-6F175D3DCCD1}">
+              <a14:hiddenFill xmlns:a14="http://schemas.microsoft.com/office/drawing/2010/main">
+                <a:solidFill>
+                  <a:schemeClr val="accent1"/>
+                </a:solidFill>
+              </a14:hiddenFill>
+            </a:ext>
+            <a:ext uri="{91240B29-F687-4F45-9708-019B960494DF}">
+              <a14:hiddenLine xmlns:a14="http://schemas.microsoft.com/office/drawing/2010/main" w="9525">
+                <a:solidFill>
+                  <a:schemeClr val="tx1"/>
+                </a:solidFill>
+                <a:miter lim="800000"/>
+                <a:headEnd/>
+                <a:tailEnd/>
+              </a14:hiddenLine>
+            </a:ext>
+          </a:extLst>
+        </p:spPr>
+      </p:pic>
+      <p:sp>
+        <p:nvSpPr>
+          <p:cNvPr id="5" name="TextBox 4"/>
+          <p:cNvSpPr txBox="1"/>
+          <p:nvPr/>
+        </p:nvSpPr>
+        <p:spPr>
+          <a:xfrm>
+            <a:off x="457200" y="4800600"/>
+            <a:ext cx="8458200" cy="1138773"/>
+          </a:xfrm>
+          <a:prstGeom prst="rect">
+            <a:avLst/>
+          </a:prstGeom>
+          <a:noFill/>
+        </p:spPr>
+        <p:txBody>
+          <a:bodyPr wrap="square" rtlCol="0">
+            <a:spAutoFit/>
+          </a:bodyPr>
+          <a:lstStyle/>
+          <a:p>
+            <a:pPr marL="438912" lvl="0" indent="-320040">
+              <a:buClr>
+                <a:srgbClr val="F0AD00"/>
+              </a:buClr>
+              <a:buSzPct val="80000"/>
+              <a:buFont typeface="Wingdings 2"/>
+              <a:buChar char=""/>
+            </a:pPr>
+            <a:r>
+              <a:rPr lang="en-US" sz="2000" dirty="0">
+                <a:solidFill>
+                  <a:prstClr val="black"/>
+                </a:solidFill>
+              </a:rPr>
               <a:t>Database and Hospital Systems</a:t>
             </a:r>
           </a:p>
           <a:p>
-            <a:pPr lvl="1"/>
-            <a:r>
-              <a:rPr lang="en-US" dirty="0" smtClean="0"/>
+            <a:pPr marL="731520" lvl="1" indent="-274320">
+              <a:spcBef>
+                <a:spcPct val="20000"/>
+              </a:spcBef>
+              <a:buClr>
+                <a:srgbClr val="60B5CC"/>
+              </a:buClr>
+              <a:buSzPct val="90000"/>
+              <a:buFont typeface="Wingdings"/>
+              <a:buChar char=""/>
+            </a:pPr>
+            <a:r>
+              <a:rPr lang="en-US" sz="2000" dirty="0">
+                <a:solidFill>
+                  <a:prstClr val="black"/>
+                </a:solidFill>
+              </a:rPr>
               <a:t>Stores and returns data correctly within a specified speed range</a:t>
             </a:r>
           </a:p>
           <a:p>
-            <a:pPr lvl="1"/>
-            <a:r>
-              <a:rPr lang="en-US" dirty="0" smtClean="0"/>
+            <a:pPr marL="731520" lvl="1" indent="-274320">
+              <a:spcBef>
+                <a:spcPct val="20000"/>
+              </a:spcBef>
+              <a:buClr>
+                <a:srgbClr val="60B5CC"/>
+              </a:buClr>
+              <a:buSzPct val="90000"/>
+              <a:buFont typeface="Wingdings"/>
+              <a:buChar char=""/>
+            </a:pPr>
+            <a:r>
+              <a:rPr lang="en-US" sz="2000" dirty="0">
+                <a:solidFill>
+                  <a:prstClr val="black"/>
+                </a:solidFill>
+              </a:rPr>
               <a:t>Fails if breaks those conditions</a:t>
             </a:r>
           </a:p>

</xml_diff>